<commit_message>
ELK commit 2019.06.06 31:13
</commit_message>
<xml_diff>
--- a/ELK/ELK 그림 모음.pptx
+++ b/ELK/ELK 그림 모음.pptx
@@ -11,6 +11,8 @@
     <p:sldId id="259" r:id="rId5"/>
     <p:sldId id="260" r:id="rId6"/>
     <p:sldId id="261" r:id="rId7"/>
+    <p:sldId id="262" r:id="rId8"/>
+    <p:sldId id="263" r:id="rId9"/>
   </p:sldIdLst>
   <p:sldSz cx="9144000" cy="6858000" type="screen4x3"/>
   <p:notesSz cx="6858000" cy="9144000"/>
@@ -293,7 +295,8 @@
           <a:p>
             <a:fld id="{4E73C227-1241-4DD4-B555-51B1E0E357F1}" type="datetimeFigureOut">
               <a:rPr lang="ko-KR" altLang="en-US" smtClean="0"/>
-              <a:t>2019-06-02</a:t>
+              <a:pPr/>
+              <a:t>2019-06-06</a:t>
             </a:fld>
             <a:endParaRPr lang="ko-KR" altLang="en-US"/>
           </a:p>
@@ -335,6 +338,7 @@
           <a:p>
             <a:fld id="{83A5F061-46FF-4DD8-8CD0-5A03AEDC3391}" type="slidenum">
               <a:rPr lang="ko-KR" altLang="en-US" smtClean="0"/>
+              <a:pPr/>
               <a:t>‹#›</a:t>
             </a:fld>
             <a:endParaRPr lang="ko-KR" altLang="en-US"/>
@@ -458,7 +462,8 @@
           <a:p>
             <a:fld id="{4E73C227-1241-4DD4-B555-51B1E0E357F1}" type="datetimeFigureOut">
               <a:rPr lang="ko-KR" altLang="en-US" smtClean="0"/>
-              <a:t>2019-06-02</a:t>
+              <a:pPr/>
+              <a:t>2019-06-06</a:t>
             </a:fld>
             <a:endParaRPr lang="ko-KR" altLang="en-US"/>
           </a:p>
@@ -500,6 +505,7 @@
           <a:p>
             <a:fld id="{83A5F061-46FF-4DD8-8CD0-5A03AEDC3391}" type="slidenum">
               <a:rPr lang="ko-KR" altLang="en-US" smtClean="0"/>
+              <a:pPr/>
               <a:t>‹#›</a:t>
             </a:fld>
             <a:endParaRPr lang="ko-KR" altLang="en-US"/>
@@ -633,7 +639,8 @@
           <a:p>
             <a:fld id="{4E73C227-1241-4DD4-B555-51B1E0E357F1}" type="datetimeFigureOut">
               <a:rPr lang="ko-KR" altLang="en-US" smtClean="0"/>
-              <a:t>2019-06-02</a:t>
+              <a:pPr/>
+              <a:t>2019-06-06</a:t>
             </a:fld>
             <a:endParaRPr lang="ko-KR" altLang="en-US"/>
           </a:p>
@@ -675,6 +682,7 @@
           <a:p>
             <a:fld id="{83A5F061-46FF-4DD8-8CD0-5A03AEDC3391}" type="slidenum">
               <a:rPr lang="ko-KR" altLang="en-US" smtClean="0"/>
+              <a:pPr/>
               <a:t>‹#›</a:t>
             </a:fld>
             <a:endParaRPr lang="ko-KR" altLang="en-US"/>
@@ -798,7 +806,8 @@
           <a:p>
             <a:fld id="{4E73C227-1241-4DD4-B555-51B1E0E357F1}" type="datetimeFigureOut">
               <a:rPr lang="ko-KR" altLang="en-US" smtClean="0"/>
-              <a:t>2019-06-02</a:t>
+              <a:pPr/>
+              <a:t>2019-06-06</a:t>
             </a:fld>
             <a:endParaRPr lang="ko-KR" altLang="en-US"/>
           </a:p>
@@ -840,6 +849,7 @@
           <a:p>
             <a:fld id="{83A5F061-46FF-4DD8-8CD0-5A03AEDC3391}" type="slidenum">
               <a:rPr lang="ko-KR" altLang="en-US" smtClean="0"/>
+              <a:pPr/>
               <a:t>‹#›</a:t>
             </a:fld>
             <a:endParaRPr lang="ko-KR" altLang="en-US"/>
@@ -1039,7 +1049,8 @@
           <a:p>
             <a:fld id="{4E73C227-1241-4DD4-B555-51B1E0E357F1}" type="datetimeFigureOut">
               <a:rPr lang="ko-KR" altLang="en-US" smtClean="0"/>
-              <a:t>2019-06-02</a:t>
+              <a:pPr/>
+              <a:t>2019-06-06</a:t>
             </a:fld>
             <a:endParaRPr lang="ko-KR" altLang="en-US"/>
           </a:p>
@@ -1081,6 +1092,7 @@
           <a:p>
             <a:fld id="{83A5F061-46FF-4DD8-8CD0-5A03AEDC3391}" type="slidenum">
               <a:rPr lang="ko-KR" altLang="en-US" smtClean="0"/>
+              <a:pPr/>
               <a:t>‹#›</a:t>
             </a:fld>
             <a:endParaRPr lang="ko-KR" altLang="en-US"/>
@@ -1322,7 +1334,8 @@
           <a:p>
             <a:fld id="{4E73C227-1241-4DD4-B555-51B1E0E357F1}" type="datetimeFigureOut">
               <a:rPr lang="ko-KR" altLang="en-US" smtClean="0"/>
-              <a:t>2019-06-02</a:t>
+              <a:pPr/>
+              <a:t>2019-06-06</a:t>
             </a:fld>
             <a:endParaRPr lang="ko-KR" altLang="en-US"/>
           </a:p>
@@ -1364,6 +1377,7 @@
           <a:p>
             <a:fld id="{83A5F061-46FF-4DD8-8CD0-5A03AEDC3391}" type="slidenum">
               <a:rPr lang="ko-KR" altLang="en-US" smtClean="0"/>
+              <a:pPr/>
               <a:t>‹#›</a:t>
             </a:fld>
             <a:endParaRPr lang="ko-KR" altLang="en-US"/>
@@ -1739,7 +1753,8 @@
           <a:p>
             <a:fld id="{4E73C227-1241-4DD4-B555-51B1E0E357F1}" type="datetimeFigureOut">
               <a:rPr lang="ko-KR" altLang="en-US" smtClean="0"/>
-              <a:t>2019-06-02</a:t>
+              <a:pPr/>
+              <a:t>2019-06-06</a:t>
             </a:fld>
             <a:endParaRPr lang="ko-KR" altLang="en-US"/>
           </a:p>
@@ -1781,6 +1796,7 @@
           <a:p>
             <a:fld id="{83A5F061-46FF-4DD8-8CD0-5A03AEDC3391}" type="slidenum">
               <a:rPr lang="ko-KR" altLang="en-US" smtClean="0"/>
+              <a:pPr/>
               <a:t>‹#›</a:t>
             </a:fld>
             <a:endParaRPr lang="ko-KR" altLang="en-US"/>
@@ -1852,7 +1868,8 @@
           <a:p>
             <a:fld id="{4E73C227-1241-4DD4-B555-51B1E0E357F1}" type="datetimeFigureOut">
               <a:rPr lang="ko-KR" altLang="en-US" smtClean="0"/>
-              <a:t>2019-06-02</a:t>
+              <a:pPr/>
+              <a:t>2019-06-06</a:t>
             </a:fld>
             <a:endParaRPr lang="ko-KR" altLang="en-US"/>
           </a:p>
@@ -1894,6 +1911,7 @@
           <a:p>
             <a:fld id="{83A5F061-46FF-4DD8-8CD0-5A03AEDC3391}" type="slidenum">
               <a:rPr lang="ko-KR" altLang="en-US" smtClean="0"/>
+              <a:pPr/>
               <a:t>‹#›</a:t>
             </a:fld>
             <a:endParaRPr lang="ko-KR" altLang="en-US"/>
@@ -1942,7 +1960,8 @@
           <a:p>
             <a:fld id="{4E73C227-1241-4DD4-B555-51B1E0E357F1}" type="datetimeFigureOut">
               <a:rPr lang="ko-KR" altLang="en-US" smtClean="0"/>
-              <a:t>2019-06-02</a:t>
+              <a:pPr/>
+              <a:t>2019-06-06</a:t>
             </a:fld>
             <a:endParaRPr lang="ko-KR" altLang="en-US"/>
           </a:p>
@@ -1984,6 +2003,7 @@
           <a:p>
             <a:fld id="{83A5F061-46FF-4DD8-8CD0-5A03AEDC3391}" type="slidenum">
               <a:rPr lang="ko-KR" altLang="en-US" smtClean="0"/>
+              <a:pPr/>
               <a:t>‹#›</a:t>
             </a:fld>
             <a:endParaRPr lang="ko-KR" altLang="en-US"/>
@@ -2214,7 +2234,8 @@
           <a:p>
             <a:fld id="{4E73C227-1241-4DD4-B555-51B1E0E357F1}" type="datetimeFigureOut">
               <a:rPr lang="ko-KR" altLang="en-US" smtClean="0"/>
-              <a:t>2019-06-02</a:t>
+              <a:pPr/>
+              <a:t>2019-06-06</a:t>
             </a:fld>
             <a:endParaRPr lang="ko-KR" altLang="en-US"/>
           </a:p>
@@ -2256,6 +2277,7 @@
           <a:p>
             <a:fld id="{83A5F061-46FF-4DD8-8CD0-5A03AEDC3391}" type="slidenum">
               <a:rPr lang="ko-KR" altLang="en-US" smtClean="0"/>
+              <a:pPr/>
               <a:t>‹#›</a:t>
             </a:fld>
             <a:endParaRPr lang="ko-KR" altLang="en-US"/>
@@ -2462,7 +2484,8 @@
           <a:p>
             <a:fld id="{4E73C227-1241-4DD4-B555-51B1E0E357F1}" type="datetimeFigureOut">
               <a:rPr lang="ko-KR" altLang="en-US" smtClean="0"/>
-              <a:t>2019-06-02</a:t>
+              <a:pPr/>
+              <a:t>2019-06-06</a:t>
             </a:fld>
             <a:endParaRPr lang="ko-KR" altLang="en-US"/>
           </a:p>
@@ -2504,6 +2527,7 @@
           <a:p>
             <a:fld id="{83A5F061-46FF-4DD8-8CD0-5A03AEDC3391}" type="slidenum">
               <a:rPr lang="ko-KR" altLang="en-US" smtClean="0"/>
+              <a:pPr/>
               <a:t>‹#›</a:t>
             </a:fld>
             <a:endParaRPr lang="ko-KR" altLang="en-US"/>
@@ -2670,7 +2694,8 @@
           <a:p>
             <a:fld id="{4E73C227-1241-4DD4-B555-51B1E0E357F1}" type="datetimeFigureOut">
               <a:rPr lang="ko-KR" altLang="en-US" smtClean="0"/>
-              <a:t>2019-06-02</a:t>
+              <a:pPr/>
+              <a:t>2019-06-06</a:t>
             </a:fld>
             <a:endParaRPr lang="ko-KR" altLang="en-US"/>
           </a:p>
@@ -2748,6 +2773,7 @@
           <a:p>
             <a:fld id="{83A5F061-46FF-4DD8-8CD0-5A03AEDC3391}" type="slidenum">
               <a:rPr lang="ko-KR" altLang="en-US" smtClean="0"/>
+              <a:pPr/>
               <a:t>‹#›</a:t>
             </a:fld>
             <a:endParaRPr lang="ko-KR" altLang="en-US"/>
@@ -3363,6 +3389,108 @@
 </p:sld>
 </file>
 
+<file path=ppt/slides/slide7.xml><?xml version="1.0" encoding="utf-8"?>
+<p:sld xmlns:a="http://schemas.openxmlformats.org/drawingml/2006/main" xmlns:r="http://schemas.openxmlformats.org/officeDocument/2006/relationships" xmlns:p="http://schemas.openxmlformats.org/presentationml/2006/main">
+  <p:cSld>
+    <p:spTree>
+      <p:nvGrpSpPr>
+        <p:cNvPr id="1" name=""/>
+        <p:cNvGrpSpPr/>
+        <p:nvPr/>
+      </p:nvGrpSpPr>
+      <p:grpSpPr>
+        <a:xfrm>
+          <a:off x="0" y="0"/>
+          <a:ext cx="0" cy="0"/>
+          <a:chOff x="0" y="0"/>
+          <a:chExt cx="0" cy="0"/>
+        </a:xfrm>
+      </p:grpSpPr>
+      <p:pic>
+        <p:nvPicPr>
+          <p:cNvPr id="1026" name="Picture 2" descr="https://t1.daumcdn.net/cfile/tistory/991F9E3F5B5065510F"/>
+          <p:cNvPicPr>
+            <a:picLocks noChangeAspect="1" noChangeArrowheads="1"/>
+          </p:cNvPicPr>
+          <p:nvPr/>
+        </p:nvPicPr>
+        <p:blipFill>
+          <a:blip r:embed="rId2" cstate="print"/>
+          <a:srcRect/>
+          <a:stretch>
+            <a:fillRect/>
+          </a:stretch>
+        </p:blipFill>
+        <p:spPr bwMode="auto">
+          <a:xfrm>
+            <a:off x="2699792" y="692696"/>
+            <a:ext cx="3961681" cy="5442633"/>
+          </a:xfrm>
+          <a:prstGeom prst="rect">
+            <a:avLst/>
+          </a:prstGeom>
+          <a:noFill/>
+        </p:spPr>
+      </p:pic>
+    </p:spTree>
+  </p:cSld>
+  <p:clrMapOvr>
+    <a:masterClrMapping/>
+  </p:clrMapOvr>
+</p:sld>
+</file>
+
+<file path=ppt/slides/slide8.xml><?xml version="1.0" encoding="utf-8"?>
+<p:sld xmlns:a="http://schemas.openxmlformats.org/drawingml/2006/main" xmlns:r="http://schemas.openxmlformats.org/officeDocument/2006/relationships" xmlns:p="http://schemas.openxmlformats.org/presentationml/2006/main">
+  <p:cSld>
+    <p:spTree>
+      <p:nvGrpSpPr>
+        <p:cNvPr id="1" name=""/>
+        <p:cNvGrpSpPr/>
+        <p:nvPr/>
+      </p:nvGrpSpPr>
+      <p:grpSpPr>
+        <a:xfrm>
+          <a:off x="0" y="0"/>
+          <a:ext cx="0" cy="0"/>
+          <a:chOff x="0" y="0"/>
+          <a:chExt cx="0" cy="0"/>
+        </a:xfrm>
+      </p:grpSpPr>
+      <p:pic>
+        <p:nvPicPr>
+          <p:cNvPr id="1026" name="Picture 2" descr="https://aboullaite.me/content/images/2017/09/shecma.jpg"/>
+          <p:cNvPicPr>
+            <a:picLocks noChangeAspect="1" noChangeArrowheads="1"/>
+          </p:cNvPicPr>
+          <p:nvPr/>
+        </p:nvPicPr>
+        <p:blipFill>
+          <a:blip r:embed="rId2" cstate="print"/>
+          <a:srcRect/>
+          <a:stretch>
+            <a:fillRect/>
+          </a:stretch>
+        </p:blipFill>
+        <p:spPr bwMode="auto">
+          <a:xfrm>
+            <a:off x="827584" y="1268760"/>
+            <a:ext cx="7305328" cy="4109247"/>
+          </a:xfrm>
+          <a:prstGeom prst="rect">
+            <a:avLst/>
+          </a:prstGeom>
+          <a:noFill/>
+        </p:spPr>
+      </p:pic>
+    </p:spTree>
+  </p:cSld>
+  <p:clrMapOvr>
+    <a:masterClrMapping/>
+  </p:clrMapOvr>
+</p:sld>
+</file>
+
 <file path=ppt/theme/theme1.xml><?xml version="1.0" encoding="utf-8"?>
 <a:theme xmlns:a="http://schemas.openxmlformats.org/drawingml/2006/main" name="Office 테마">
   <a:themeElements>

</xml_diff>

<commit_message>
ELK commit 2019.06.06 21:05
</commit_message>
<xml_diff>
--- a/ELK/ELK 그림 모음.pptx
+++ b/ELK/ELK 그림 모음.pptx
@@ -12,7 +12,6 @@
     <p:sldId id="260" r:id="rId6"/>
     <p:sldId id="261" r:id="rId7"/>
     <p:sldId id="262" r:id="rId8"/>
-    <p:sldId id="263" r:id="rId9"/>
   </p:sldIdLst>
   <p:sldSz cx="9144000" cy="6858000" type="screen4x3"/>
   <p:notesSz cx="6858000" cy="9144000"/>
@@ -3440,57 +3439,6 @@
 </p:sld>
 </file>
 
-<file path=ppt/slides/slide8.xml><?xml version="1.0" encoding="utf-8"?>
-<p:sld xmlns:a="http://schemas.openxmlformats.org/drawingml/2006/main" xmlns:r="http://schemas.openxmlformats.org/officeDocument/2006/relationships" xmlns:p="http://schemas.openxmlformats.org/presentationml/2006/main">
-  <p:cSld>
-    <p:spTree>
-      <p:nvGrpSpPr>
-        <p:cNvPr id="1" name=""/>
-        <p:cNvGrpSpPr/>
-        <p:nvPr/>
-      </p:nvGrpSpPr>
-      <p:grpSpPr>
-        <a:xfrm>
-          <a:off x="0" y="0"/>
-          <a:ext cx="0" cy="0"/>
-          <a:chOff x="0" y="0"/>
-          <a:chExt cx="0" cy="0"/>
-        </a:xfrm>
-      </p:grpSpPr>
-      <p:pic>
-        <p:nvPicPr>
-          <p:cNvPr id="1026" name="Picture 2" descr="https://aboullaite.me/content/images/2017/09/shecma.jpg"/>
-          <p:cNvPicPr>
-            <a:picLocks noChangeAspect="1" noChangeArrowheads="1"/>
-          </p:cNvPicPr>
-          <p:nvPr/>
-        </p:nvPicPr>
-        <p:blipFill>
-          <a:blip r:embed="rId2" cstate="print"/>
-          <a:srcRect/>
-          <a:stretch>
-            <a:fillRect/>
-          </a:stretch>
-        </p:blipFill>
-        <p:spPr bwMode="auto">
-          <a:xfrm>
-            <a:off x="827584" y="1268760"/>
-            <a:ext cx="7305328" cy="4109247"/>
-          </a:xfrm>
-          <a:prstGeom prst="rect">
-            <a:avLst/>
-          </a:prstGeom>
-          <a:noFill/>
-        </p:spPr>
-      </p:pic>
-    </p:spTree>
-  </p:cSld>
-  <p:clrMapOvr>
-    <a:masterClrMapping/>
-  </p:clrMapOvr>
-</p:sld>
-</file>
-
 <file path=ppt/theme/theme1.xml><?xml version="1.0" encoding="utf-8"?>
 <a:theme xmlns:a="http://schemas.openxmlformats.org/drawingml/2006/main" name="Office 테마">
   <a:themeElements>

</xml_diff>